<commit_message>
[feature] add departament ranking
</commit_message>
<xml_diff>
--- a/diagrams/architecture.pptx
+++ b/diagrams/architecture.pptx
@@ -104,6 +104,11 @@
       </a:defRPr>
     </a:lvl9pPr>
   </p:defaultTextStyle>
+  <p:extLst>
+    <p:ext uri="{EFAFB233-063F-42B5-8137-9DF3F51BA10A}">
+      <p15:sldGuideLst xmlns:p15="http://schemas.microsoft.com/office/powerpoint/2012/main"/>
+    </p:ext>
+  </p:extLst>
 </p:presentation>
 </file>
 
@@ -256,7 +261,7 @@
           <a:p>
             <a:fld id="{EF9C3795-B69D-7945-AAA3-3E31757843FF}" type="datetimeFigureOut">
               <a:rPr lang="en-GB" smtClean="0"/>
-              <a:t>02/04/2019</a:t>
+              <a:t>03/04/2019</a:t>
             </a:fld>
             <a:endParaRPr lang="en-GB"/>
           </a:p>
@@ -431,7 +436,7 @@
           <a:p>
             <a:fld id="{EF9C3795-B69D-7945-AAA3-3E31757843FF}" type="datetimeFigureOut">
               <a:rPr lang="en-GB" smtClean="0"/>
-              <a:t>02/04/2019</a:t>
+              <a:t>03/04/2019</a:t>
             </a:fld>
             <a:endParaRPr lang="en-GB"/>
           </a:p>
@@ -616,7 +621,7 @@
           <a:p>
             <a:fld id="{EF9C3795-B69D-7945-AAA3-3E31757843FF}" type="datetimeFigureOut">
               <a:rPr lang="en-GB" smtClean="0"/>
-              <a:t>02/04/2019</a:t>
+              <a:t>03/04/2019</a:t>
             </a:fld>
             <a:endParaRPr lang="en-GB"/>
           </a:p>
@@ -791,7 +796,7 @@
           <a:p>
             <a:fld id="{EF9C3795-B69D-7945-AAA3-3E31757843FF}" type="datetimeFigureOut">
               <a:rPr lang="en-GB" smtClean="0"/>
-              <a:t>02/04/2019</a:t>
+              <a:t>03/04/2019</a:t>
             </a:fld>
             <a:endParaRPr lang="en-GB"/>
           </a:p>
@@ -1071,7 +1076,7 @@
           <a:p>
             <a:fld id="{EF9C3795-B69D-7945-AAA3-3E31757843FF}" type="datetimeFigureOut">
               <a:rPr lang="en-GB" smtClean="0"/>
-              <a:t>02/04/2019</a:t>
+              <a:t>03/04/2019</a:t>
             </a:fld>
             <a:endParaRPr lang="en-GB"/>
           </a:p>
@@ -1289,7 +1294,7 @@
           <a:p>
             <a:fld id="{EF9C3795-B69D-7945-AAA3-3E31757843FF}" type="datetimeFigureOut">
               <a:rPr lang="en-GB" smtClean="0"/>
-              <a:t>02/04/2019</a:t>
+              <a:t>03/04/2019</a:t>
             </a:fld>
             <a:endParaRPr lang="en-GB"/>
           </a:p>
@@ -1662,7 +1667,7 @@
           <a:p>
             <a:fld id="{EF9C3795-B69D-7945-AAA3-3E31757843FF}" type="datetimeFigureOut">
               <a:rPr lang="en-GB" smtClean="0"/>
-              <a:t>02/04/2019</a:t>
+              <a:t>03/04/2019</a:t>
             </a:fld>
             <a:endParaRPr lang="en-GB"/>
           </a:p>
@@ -1804,7 +1809,7 @@
           <a:p>
             <a:fld id="{EF9C3795-B69D-7945-AAA3-3E31757843FF}" type="datetimeFigureOut">
               <a:rPr lang="en-GB" smtClean="0"/>
-              <a:t>02/04/2019</a:t>
+              <a:t>03/04/2019</a:t>
             </a:fld>
             <a:endParaRPr lang="en-GB"/>
           </a:p>
@@ -1917,7 +1922,7 @@
           <a:p>
             <a:fld id="{EF9C3795-B69D-7945-AAA3-3E31757843FF}" type="datetimeFigureOut">
               <a:rPr lang="en-GB" smtClean="0"/>
-              <a:t>02/04/2019</a:t>
+              <a:t>03/04/2019</a:t>
             </a:fld>
             <a:endParaRPr lang="en-GB"/>
           </a:p>
@@ -2209,7 +2214,7 @@
           <a:p>
             <a:fld id="{EF9C3795-B69D-7945-AAA3-3E31757843FF}" type="datetimeFigureOut">
               <a:rPr lang="en-GB" smtClean="0"/>
-              <a:t>02/04/2019</a:t>
+              <a:t>03/04/2019</a:t>
             </a:fld>
             <a:endParaRPr lang="en-GB"/>
           </a:p>
@@ -2502,7 +2507,7 @@
           <a:p>
             <a:fld id="{EF9C3795-B69D-7945-AAA3-3E31757843FF}" type="datetimeFigureOut">
               <a:rPr lang="en-GB" smtClean="0"/>
-              <a:t>02/04/2019</a:t>
+              <a:t>03/04/2019</a:t>
             </a:fld>
             <a:endParaRPr lang="en-GB"/>
           </a:p>
@@ -2720,7 +2725,7 @@
           <a:p>
             <a:fld id="{EF9C3795-B69D-7945-AAA3-3E31757843FF}" type="datetimeFigureOut">
               <a:rPr lang="en-GB" smtClean="0"/>
-              <a:t>02/04/2019</a:t>
+              <a:t>03/04/2019</a:t>
             </a:fld>
             <a:endParaRPr lang="en-GB"/>
           </a:p>
@@ -3243,7 +3248,7 @@
         </p:nvSpPr>
         <p:spPr>
           <a:xfrm>
-            <a:off x="5355771" y="3281171"/>
+            <a:off x="5123112" y="3080811"/>
             <a:ext cx="1135464" cy="844061"/>
           </a:xfrm>
           <a:prstGeom prst="roundRect">
@@ -3306,7 +3311,7 @@
         </p:blipFill>
         <p:spPr>
           <a:xfrm>
-            <a:off x="5418743" y="2836368"/>
+            <a:off x="5186084" y="2636008"/>
             <a:ext cx="657609" cy="463615"/>
           </a:xfrm>
           <a:prstGeom prst="rect">
@@ -3342,7 +3347,7 @@
         </p:blipFill>
         <p:spPr>
           <a:xfrm>
-            <a:off x="5963810" y="2909402"/>
+            <a:off x="5731151" y="2709042"/>
             <a:ext cx="351470" cy="317549"/>
           </a:xfrm>
           <a:prstGeom prst="rect">
@@ -3364,7 +3369,7 @@
         </p:nvSpPr>
         <p:spPr>
           <a:xfrm>
-            <a:off x="3226390" y="1476604"/>
+            <a:off x="2803924" y="1458054"/>
             <a:ext cx="2129381" cy="1362471"/>
           </a:xfrm>
           <a:prstGeom prst="cloud">
@@ -3449,8 +3454,8 @@
         </p:nvCxnSpPr>
         <p:spPr>
           <a:xfrm flipV="1">
-            <a:off x="4443861" y="3703202"/>
-            <a:ext cx="911910" cy="235752"/>
+            <a:off x="4335111" y="3502842"/>
+            <a:ext cx="788001" cy="212355"/>
           </a:xfrm>
           <a:prstGeom prst="straightConnector1">
             <a:avLst/>
@@ -3483,13 +3488,15 @@
               </a:ext>
             </a:extLst>
           </p:cNvPr>
-          <p:cNvCxnSpPr/>
+          <p:cNvCxnSpPr>
+            <a:cxnSpLocks/>
+          </p:cNvCxnSpPr>
           <p:nvPr/>
         </p:nvCxnSpPr>
         <p:spPr>
           <a:xfrm flipV="1">
-            <a:off x="3868615" y="2839075"/>
-            <a:ext cx="241161" cy="788380"/>
+            <a:off x="3773105" y="2882824"/>
+            <a:ext cx="0" cy="808382"/>
           </a:xfrm>
           <a:prstGeom prst="straightConnector1">
             <a:avLst/>
@@ -3527,8 +3534,8 @@
         </p:nvSpPr>
         <p:spPr>
           <a:xfrm>
-            <a:off x="7169497" y="3269176"/>
-            <a:ext cx="1135464" cy="844061"/>
+            <a:off x="7074040" y="3707842"/>
+            <a:ext cx="1397512" cy="844061"/>
           </a:xfrm>
           <a:prstGeom prst="roundRect">
             <a:avLst/>
@@ -3555,10 +3562,7 @@
           <a:lstStyle/>
           <a:p>
             <a:pPr algn="ctr"/>
-            <a:r>
-              <a:rPr lang="en-GB" dirty="0"/>
-              <a:t>Backend</a:t>
-            </a:r>
+            <a:endParaRPr lang="en-GB" dirty="0"/>
           </a:p>
         </p:txBody>
       </p:sp>
@@ -3579,9 +3583,9 @@
           <p:nvPr/>
         </p:nvCxnSpPr>
         <p:spPr>
-          <a:xfrm flipV="1">
-            <a:off x="6491235" y="3691207"/>
-            <a:ext cx="678262" cy="11995"/>
+          <a:xfrm>
+            <a:off x="6258576" y="3502842"/>
+            <a:ext cx="815464" cy="627031"/>
           </a:xfrm>
           <a:prstGeom prst="straightConnector1">
             <a:avLst/>
@@ -3633,7 +3637,7 @@
         </p:blipFill>
         <p:spPr>
           <a:xfrm>
-            <a:off x="8168603" y="3487551"/>
+            <a:off x="8386138" y="3921577"/>
             <a:ext cx="814620" cy="407310"/>
           </a:xfrm>
           <a:prstGeom prst="rect">
@@ -3669,7 +3673,7 @@
         </p:blipFill>
         <p:spPr>
           <a:xfrm>
-            <a:off x="8189401" y="4461468"/>
+            <a:off x="8227305" y="4909368"/>
             <a:ext cx="361741" cy="373196"/>
           </a:xfrm>
           <a:prstGeom prst="rect">
@@ -3691,7 +3695,7 @@
         </p:nvSpPr>
         <p:spPr>
           <a:xfrm>
-            <a:off x="7345343" y="4369488"/>
+            <a:off x="7383247" y="4817388"/>
             <a:ext cx="779099" cy="514011"/>
           </a:xfrm>
           <a:prstGeom prst="can">
@@ -3743,9 +3747,9 @@
           <p:nvPr/>
         </p:nvCxnSpPr>
         <p:spPr>
-          <a:xfrm flipH="1">
-            <a:off x="7734893" y="4113237"/>
-            <a:ext cx="2336" cy="256251"/>
+          <a:xfrm>
+            <a:off x="7772796" y="4551903"/>
+            <a:ext cx="1" cy="265485"/>
           </a:xfrm>
           <a:prstGeom prst="straightConnector1">
             <a:avLst/>
@@ -3779,6 +3783,7 @@
             </a:extLst>
           </p:cNvPr>
           <p:cNvCxnSpPr>
+            <a:cxnSpLocks/>
             <a:stCxn id="17" idx="0"/>
             <a:endCxn id="10" idx="0"/>
           </p:cNvCxnSpPr>
@@ -3786,8 +3791,8 @@
         </p:nvCxnSpPr>
         <p:spPr>
           <a:xfrm rot="16200000" flipV="1">
-            <a:off x="5989945" y="1521892"/>
-            <a:ext cx="1111336" cy="2383232"/>
+            <a:off x="5567888" y="1502933"/>
+            <a:ext cx="1568552" cy="2841265"/>
           </a:xfrm>
           <a:prstGeom prst="bentConnector2">
             <a:avLst/>
@@ -3811,6 +3816,653 @@
           </a:fontRef>
         </p:style>
       </p:cxnSp>
+      <p:cxnSp>
+        <p:nvCxnSpPr>
+          <p:cNvPr id="38" name="Conector recto de flecha 37">
+            <a:extLst>
+              <a:ext uri="{FF2B5EF4-FFF2-40B4-BE49-F238E27FC236}">
+                <a16:creationId xmlns:a16="http://schemas.microsoft.com/office/drawing/2014/main" id="{54FC016F-A033-E343-8DF1-84D92AE90F6E}"/>
+              </a:ext>
+            </a:extLst>
+          </p:cNvPr>
+          <p:cNvCxnSpPr>
+            <a:cxnSpLocks/>
+          </p:cNvCxnSpPr>
+          <p:nvPr/>
+        </p:nvCxnSpPr>
+        <p:spPr>
+          <a:xfrm>
+            <a:off x="4551903" y="4251612"/>
+            <a:ext cx="2504397" cy="0"/>
+          </a:xfrm>
+          <a:prstGeom prst="straightConnector1">
+            <a:avLst/>
+          </a:prstGeom>
+          <a:ln>
+            <a:tailEnd type="triangle"/>
+          </a:ln>
+        </p:spPr>
+        <p:style>
+          <a:lnRef idx="2">
+            <a:schemeClr val="dk1"/>
+          </a:lnRef>
+          <a:fillRef idx="0">
+            <a:schemeClr val="dk1"/>
+          </a:fillRef>
+          <a:effectRef idx="1">
+            <a:schemeClr val="dk1"/>
+          </a:effectRef>
+          <a:fontRef idx="minor">
+            <a:schemeClr val="tx1"/>
+          </a:fontRef>
+        </p:style>
+      </p:cxnSp>
+      <p:sp>
+        <p:nvSpPr>
+          <p:cNvPr id="40" name="CuadroTexto 39">
+            <a:extLst>
+              <a:ext uri="{FF2B5EF4-FFF2-40B4-BE49-F238E27FC236}">
+                <a16:creationId xmlns:a16="http://schemas.microsoft.com/office/drawing/2014/main" id="{59CDC51F-1E63-D840-BCB3-965CB656BD76}"/>
+              </a:ext>
+            </a:extLst>
+          </p:cNvPr>
+          <p:cNvSpPr txBox="1"/>
+          <p:nvPr/>
+        </p:nvSpPr>
+        <p:spPr>
+          <a:xfrm>
+            <a:off x="5038376" y="4277595"/>
+            <a:ext cx="1502784" cy="276999"/>
+          </a:xfrm>
+          <a:prstGeom prst="rect">
+            <a:avLst/>
+          </a:prstGeom>
+          <a:noFill/>
+        </p:spPr>
+        <p:txBody>
+          <a:bodyPr wrap="none" rtlCol="0">
+            <a:spAutoFit/>
+          </a:bodyPr>
+          <a:lstStyle/>
+          <a:p>
+            <a:r>
+              <a:rPr lang="en-GB" sz="1200" dirty="0"/>
+              <a:t>https://domain/login</a:t>
+            </a:r>
+          </a:p>
+        </p:txBody>
+      </p:sp>
+      <p:sp>
+        <p:nvSpPr>
+          <p:cNvPr id="41" name="CuadroTexto 40">
+            <a:extLst>
+              <a:ext uri="{FF2B5EF4-FFF2-40B4-BE49-F238E27FC236}">
+                <a16:creationId xmlns:a16="http://schemas.microsoft.com/office/drawing/2014/main" id="{392A38AE-F60C-9944-8135-E92A74E3BD01}"/>
+              </a:ext>
+            </a:extLst>
+          </p:cNvPr>
+          <p:cNvSpPr txBox="1"/>
+          <p:nvPr/>
+        </p:nvSpPr>
+        <p:spPr>
+          <a:xfrm>
+            <a:off x="6321548" y="3092186"/>
+            <a:ext cx="951414" cy="461665"/>
+          </a:xfrm>
+          <a:prstGeom prst="rect">
+            <a:avLst/>
+          </a:prstGeom>
+          <a:noFill/>
+        </p:spPr>
+        <p:txBody>
+          <a:bodyPr wrap="none" rtlCol="0">
+            <a:spAutoFit/>
+          </a:bodyPr>
+          <a:lstStyle/>
+          <a:p>
+            <a:r>
+              <a:rPr lang="en-GB" sz="1200" dirty="0"/>
+              <a:t>/user</a:t>
+            </a:r>
+          </a:p>
+          <a:p>
+            <a:r>
+              <a:rPr lang="en-GB" sz="1200" dirty="0"/>
+              <a:t>/api/ranking</a:t>
+            </a:r>
+          </a:p>
+        </p:txBody>
+      </p:sp>
+      <p:sp>
+        <p:nvSpPr>
+          <p:cNvPr id="43" name="CuadroTexto 42">
+            <a:extLst>
+              <a:ext uri="{FF2B5EF4-FFF2-40B4-BE49-F238E27FC236}">
+                <a16:creationId xmlns:a16="http://schemas.microsoft.com/office/drawing/2014/main" id="{562751BE-DC41-5043-8513-05DF5442A9BA}"/>
+              </a:ext>
+            </a:extLst>
+          </p:cNvPr>
+          <p:cNvSpPr txBox="1"/>
+          <p:nvPr/>
+        </p:nvSpPr>
+        <p:spPr>
+          <a:xfrm>
+            <a:off x="5123112" y="1435033"/>
+            <a:ext cx="4167551" cy="646331"/>
+          </a:xfrm>
+          <a:prstGeom prst="rect">
+            <a:avLst/>
+          </a:prstGeom>
+          <a:noFill/>
+        </p:spPr>
+        <p:txBody>
+          <a:bodyPr wrap="none" rtlCol="0">
+            <a:spAutoFit/>
+          </a:bodyPr>
+          <a:lstStyle/>
+          <a:p>
+            <a:r>
+              <a:rPr lang="es-ES" sz="1200" dirty="0"/>
+              <a:t>https://api.fitbit.com/1/user/-/activities/steps/date/%s/1w.json</a:t>
+            </a:r>
+          </a:p>
+          <a:p>
+            <a:r>
+              <a:rPr lang="es-ES" sz="1200" dirty="0"/>
+              <a:t>https://api.fitbit.com/oauth2/token</a:t>
+            </a:r>
+          </a:p>
+          <a:p>
+            <a:r>
+              <a:rPr lang="es-ES" sz="1200" dirty="0"/>
+              <a:t>https://www.fitbit.com/oauth2/authorize</a:t>
+            </a:r>
+          </a:p>
+        </p:txBody>
+      </p:sp>
+      <p:sp>
+        <p:nvSpPr>
+          <p:cNvPr id="44" name="CuadroTexto 43">
+            <a:extLst>
+              <a:ext uri="{FF2B5EF4-FFF2-40B4-BE49-F238E27FC236}">
+                <a16:creationId xmlns:a16="http://schemas.microsoft.com/office/drawing/2014/main" id="{B6245417-EA97-BA4D-A6D7-36200B29C28C}"/>
+              </a:ext>
+            </a:extLst>
+          </p:cNvPr>
+          <p:cNvSpPr txBox="1"/>
+          <p:nvPr/>
+        </p:nvSpPr>
+        <p:spPr>
+          <a:xfrm>
+            <a:off x="1591679" y="2930851"/>
+            <a:ext cx="2214581" cy="461665"/>
+          </a:xfrm>
+          <a:prstGeom prst="rect">
+            <a:avLst/>
+          </a:prstGeom>
+          <a:noFill/>
+        </p:spPr>
+        <p:txBody>
+          <a:bodyPr wrap="none" rtlCol="0">
+            <a:spAutoFit/>
+          </a:bodyPr>
+          <a:lstStyle/>
+          <a:p>
+            <a:r>
+              <a:rPr lang="es-ES" sz="1200" dirty="0"/>
+              <a:t>https://www.fitbit.com/login</a:t>
+            </a:r>
+          </a:p>
+          <a:p>
+            <a:r>
+              <a:rPr lang="es-ES" sz="1200" dirty="0"/>
+              <a:t>Redirect -&gt; https://domain/login</a:t>
+            </a:r>
+          </a:p>
+        </p:txBody>
+      </p:sp>
+      <p:sp>
+        <p:nvSpPr>
+          <p:cNvPr id="46" name="Elipse 45">
+            <a:extLst>
+              <a:ext uri="{FF2B5EF4-FFF2-40B4-BE49-F238E27FC236}">
+                <a16:creationId xmlns:a16="http://schemas.microsoft.com/office/drawing/2014/main" id="{0EEBBC2B-BF12-3A47-ADDA-A7F801F04FB4}"/>
+              </a:ext>
+            </a:extLst>
+          </p:cNvPr>
+          <p:cNvSpPr/>
+          <p:nvPr/>
+        </p:nvSpPr>
+        <p:spPr>
+          <a:xfrm>
+            <a:off x="4462970" y="3306320"/>
+            <a:ext cx="251208" cy="271306"/>
+          </a:xfrm>
+          <a:prstGeom prst="ellipse">
+            <a:avLst/>
+          </a:prstGeom>
+        </p:spPr>
+        <p:style>
+          <a:lnRef idx="1">
+            <a:schemeClr val="accent4"/>
+          </a:lnRef>
+          <a:fillRef idx="2">
+            <a:schemeClr val="accent4"/>
+          </a:fillRef>
+          <a:effectRef idx="1">
+            <a:schemeClr val="accent4"/>
+          </a:effectRef>
+          <a:fontRef idx="minor">
+            <a:schemeClr val="dk1"/>
+          </a:fontRef>
+        </p:style>
+        <p:txBody>
+          <a:bodyPr rtlCol="0" anchor="ctr"/>
+          <a:lstStyle/>
+          <a:p>
+            <a:pPr algn="ctr"/>
+            <a:r>
+              <a:rPr lang="en-GB" sz="1200" dirty="0"/>
+              <a:t>1</a:t>
+            </a:r>
+          </a:p>
+        </p:txBody>
+      </p:sp>
+      <p:sp>
+        <p:nvSpPr>
+          <p:cNvPr id="47" name="Elipse 46">
+            <a:extLst>
+              <a:ext uri="{FF2B5EF4-FFF2-40B4-BE49-F238E27FC236}">
+                <a16:creationId xmlns:a16="http://schemas.microsoft.com/office/drawing/2014/main" id="{2E5F4659-04E1-8345-9216-3A69793C11A1}"/>
+              </a:ext>
+            </a:extLst>
+          </p:cNvPr>
+          <p:cNvSpPr/>
+          <p:nvPr/>
+        </p:nvSpPr>
+        <p:spPr>
+          <a:xfrm>
+            <a:off x="3831907" y="3120144"/>
+            <a:ext cx="251208" cy="271306"/>
+          </a:xfrm>
+          <a:prstGeom prst="ellipse">
+            <a:avLst/>
+          </a:prstGeom>
+        </p:spPr>
+        <p:style>
+          <a:lnRef idx="1">
+            <a:schemeClr val="accent4"/>
+          </a:lnRef>
+          <a:fillRef idx="2">
+            <a:schemeClr val="accent4"/>
+          </a:fillRef>
+          <a:effectRef idx="1">
+            <a:schemeClr val="accent4"/>
+          </a:effectRef>
+          <a:fontRef idx="minor">
+            <a:schemeClr val="dk1"/>
+          </a:fontRef>
+        </p:style>
+        <p:txBody>
+          <a:bodyPr rtlCol="0" anchor="ctr"/>
+          <a:lstStyle/>
+          <a:p>
+            <a:pPr algn="ctr"/>
+            <a:r>
+              <a:rPr lang="en-GB" sz="1200" dirty="0"/>
+              <a:t>2</a:t>
+            </a:r>
+          </a:p>
+        </p:txBody>
+      </p:sp>
+      <p:sp>
+        <p:nvSpPr>
+          <p:cNvPr id="48" name="Elipse 47">
+            <a:extLst>
+              <a:ext uri="{FF2B5EF4-FFF2-40B4-BE49-F238E27FC236}">
+                <a16:creationId xmlns:a16="http://schemas.microsoft.com/office/drawing/2014/main" id="{61839B66-B812-2849-A146-13FF4471DA28}"/>
+              </a:ext>
+            </a:extLst>
+          </p:cNvPr>
+          <p:cNvSpPr/>
+          <p:nvPr/>
+        </p:nvSpPr>
+        <p:spPr>
+          <a:xfrm>
+            <a:off x="5665948" y="4553564"/>
+            <a:ext cx="251208" cy="271306"/>
+          </a:xfrm>
+          <a:prstGeom prst="ellipse">
+            <a:avLst/>
+          </a:prstGeom>
+        </p:spPr>
+        <p:style>
+          <a:lnRef idx="1">
+            <a:schemeClr val="accent4"/>
+          </a:lnRef>
+          <a:fillRef idx="2">
+            <a:schemeClr val="accent4"/>
+          </a:fillRef>
+          <a:effectRef idx="1">
+            <a:schemeClr val="accent4"/>
+          </a:effectRef>
+          <a:fontRef idx="minor">
+            <a:schemeClr val="dk1"/>
+          </a:fontRef>
+        </p:style>
+        <p:txBody>
+          <a:bodyPr rtlCol="0" anchor="ctr"/>
+          <a:lstStyle/>
+          <a:p>
+            <a:pPr algn="ctr"/>
+            <a:r>
+              <a:rPr lang="en-GB" sz="1200" dirty="0"/>
+              <a:t>3</a:t>
+            </a:r>
+          </a:p>
+        </p:txBody>
+      </p:sp>
+      <p:sp>
+        <p:nvSpPr>
+          <p:cNvPr id="49" name="Elipse 48">
+            <a:extLst>
+              <a:ext uri="{FF2B5EF4-FFF2-40B4-BE49-F238E27FC236}">
+                <a16:creationId xmlns:a16="http://schemas.microsoft.com/office/drawing/2014/main" id="{FF80D4F8-5F70-E449-98FB-3A0A940BC9D0}"/>
+              </a:ext>
+            </a:extLst>
+          </p:cNvPr>
+          <p:cNvSpPr/>
+          <p:nvPr/>
+        </p:nvSpPr>
+        <p:spPr>
+          <a:xfrm>
+            <a:off x="7062241" y="4731763"/>
+            <a:ext cx="251208" cy="271306"/>
+          </a:xfrm>
+          <a:prstGeom prst="ellipse">
+            <a:avLst/>
+          </a:prstGeom>
+        </p:spPr>
+        <p:style>
+          <a:lnRef idx="1">
+            <a:schemeClr val="accent4"/>
+          </a:lnRef>
+          <a:fillRef idx="2">
+            <a:schemeClr val="accent4"/>
+          </a:fillRef>
+          <a:effectRef idx="1">
+            <a:schemeClr val="accent4"/>
+          </a:effectRef>
+          <a:fontRef idx="minor">
+            <a:schemeClr val="dk1"/>
+          </a:fontRef>
+        </p:style>
+        <p:txBody>
+          <a:bodyPr rtlCol="0" anchor="ctr"/>
+          <a:lstStyle/>
+          <a:p>
+            <a:pPr algn="ctr"/>
+            <a:r>
+              <a:rPr lang="en-GB" sz="1200" dirty="0"/>
+              <a:t>4</a:t>
+            </a:r>
+          </a:p>
+        </p:txBody>
+      </p:sp>
+      <p:sp>
+        <p:nvSpPr>
+          <p:cNvPr id="50" name="Elipse 49">
+            <a:extLst>
+              <a:ext uri="{FF2B5EF4-FFF2-40B4-BE49-F238E27FC236}">
+                <a16:creationId xmlns:a16="http://schemas.microsoft.com/office/drawing/2014/main" id="{5D4B411E-21ED-3C48-97F5-B096D1B0A7D5}"/>
+              </a:ext>
+            </a:extLst>
+          </p:cNvPr>
+          <p:cNvSpPr/>
+          <p:nvPr/>
+        </p:nvSpPr>
+        <p:spPr>
+          <a:xfrm>
+            <a:off x="6688358" y="3527082"/>
+            <a:ext cx="251208" cy="271306"/>
+          </a:xfrm>
+          <a:prstGeom prst="ellipse">
+            <a:avLst/>
+          </a:prstGeom>
+        </p:spPr>
+        <p:style>
+          <a:lnRef idx="1">
+            <a:schemeClr val="accent4"/>
+          </a:lnRef>
+          <a:fillRef idx="2">
+            <a:schemeClr val="accent4"/>
+          </a:fillRef>
+          <a:effectRef idx="1">
+            <a:schemeClr val="accent4"/>
+          </a:effectRef>
+          <a:fontRef idx="minor">
+            <a:schemeClr val="dk1"/>
+          </a:fontRef>
+        </p:style>
+        <p:txBody>
+          <a:bodyPr rtlCol="0" anchor="ctr"/>
+          <a:lstStyle/>
+          <a:p>
+            <a:pPr algn="ctr"/>
+            <a:r>
+              <a:rPr lang="en-GB" sz="1200" dirty="0"/>
+              <a:t>5</a:t>
+            </a:r>
+          </a:p>
+        </p:txBody>
+      </p:sp>
+      <p:sp>
+        <p:nvSpPr>
+          <p:cNvPr id="53" name="Elipse 52">
+            <a:extLst>
+              <a:ext uri="{FF2B5EF4-FFF2-40B4-BE49-F238E27FC236}">
+                <a16:creationId xmlns:a16="http://schemas.microsoft.com/office/drawing/2014/main" id="{8449530D-5B2A-F648-97C0-D84E90DA3EA6}"/>
+              </a:ext>
+            </a:extLst>
+          </p:cNvPr>
+          <p:cNvSpPr/>
+          <p:nvPr/>
+        </p:nvSpPr>
+        <p:spPr>
+          <a:xfrm>
+            <a:off x="7060319" y="5074393"/>
+            <a:ext cx="251208" cy="271306"/>
+          </a:xfrm>
+          <a:prstGeom prst="ellipse">
+            <a:avLst/>
+          </a:prstGeom>
+        </p:spPr>
+        <p:style>
+          <a:lnRef idx="1">
+            <a:schemeClr val="accent4"/>
+          </a:lnRef>
+          <a:fillRef idx="2">
+            <a:schemeClr val="accent4"/>
+          </a:fillRef>
+          <a:effectRef idx="1">
+            <a:schemeClr val="accent4"/>
+          </a:effectRef>
+          <a:fontRef idx="minor">
+            <a:schemeClr val="dk1"/>
+          </a:fontRef>
+        </p:style>
+        <p:txBody>
+          <a:bodyPr rtlCol="0" anchor="ctr"/>
+          <a:lstStyle/>
+          <a:p>
+            <a:pPr algn="ctr"/>
+            <a:r>
+              <a:rPr lang="en-GB" sz="1200" dirty="0"/>
+              <a:t>7</a:t>
+            </a:r>
+          </a:p>
+        </p:txBody>
+      </p:sp>
+      <p:sp>
+        <p:nvSpPr>
+          <p:cNvPr id="54" name="Elipse 53">
+            <a:extLst>
+              <a:ext uri="{FF2B5EF4-FFF2-40B4-BE49-F238E27FC236}">
+                <a16:creationId xmlns:a16="http://schemas.microsoft.com/office/drawing/2014/main" id="{6D0D6884-9401-B14C-B8D9-86B7D05A0C57}"/>
+              </a:ext>
+            </a:extLst>
+          </p:cNvPr>
+          <p:cNvSpPr/>
+          <p:nvPr/>
+        </p:nvSpPr>
+        <p:spPr>
+          <a:xfrm>
+            <a:off x="7863707" y="3231535"/>
+            <a:ext cx="251208" cy="271306"/>
+          </a:xfrm>
+          <a:prstGeom prst="ellipse">
+            <a:avLst/>
+          </a:prstGeom>
+        </p:spPr>
+        <p:style>
+          <a:lnRef idx="1">
+            <a:schemeClr val="accent4"/>
+          </a:lnRef>
+          <a:fillRef idx="2">
+            <a:schemeClr val="accent4"/>
+          </a:fillRef>
+          <a:effectRef idx="1">
+            <a:schemeClr val="accent4"/>
+          </a:effectRef>
+          <a:fontRef idx="minor">
+            <a:schemeClr val="dk1"/>
+          </a:fontRef>
+        </p:style>
+        <p:txBody>
+          <a:bodyPr rtlCol="0" anchor="ctr"/>
+          <a:lstStyle/>
+          <a:p>
+            <a:pPr algn="ctr"/>
+            <a:r>
+              <a:rPr lang="en-GB" sz="1200" dirty="0"/>
+              <a:t>6</a:t>
+            </a:r>
+          </a:p>
+        </p:txBody>
+      </p:sp>
+      <p:sp>
+        <p:nvSpPr>
+          <p:cNvPr id="59" name="CuadroTexto 58">
+            <a:extLst>
+              <a:ext uri="{FF2B5EF4-FFF2-40B4-BE49-F238E27FC236}">
+                <a16:creationId xmlns:a16="http://schemas.microsoft.com/office/drawing/2014/main" id="{18B7602F-30F3-BF41-A93A-4541B9C7F692}"/>
+              </a:ext>
+            </a:extLst>
+          </p:cNvPr>
+          <p:cNvSpPr txBox="1"/>
+          <p:nvPr/>
+        </p:nvSpPr>
+        <p:spPr>
+          <a:xfrm>
+            <a:off x="7105789" y="4153511"/>
+            <a:ext cx="1444626" cy="261610"/>
+          </a:xfrm>
+          <a:prstGeom prst="rect">
+            <a:avLst/>
+          </a:prstGeom>
+          <a:noFill/>
+        </p:spPr>
+        <p:txBody>
+          <a:bodyPr wrap="none" rtlCol="0">
+            <a:spAutoFit/>
+          </a:bodyPr>
+          <a:lstStyle/>
+          <a:p>
+            <a:r>
+              <a:rPr lang="en-GB" sz="1100" dirty="0">
+                <a:solidFill>
+                  <a:schemeClr val="bg1"/>
+                </a:solidFill>
+              </a:rPr>
+              <a:t>(services &amp; scheduler)</a:t>
+            </a:r>
+          </a:p>
+        </p:txBody>
+      </p:sp>
+      <p:sp>
+        <p:nvSpPr>
+          <p:cNvPr id="60" name="CuadroTexto 59">
+            <a:extLst>
+              <a:ext uri="{FF2B5EF4-FFF2-40B4-BE49-F238E27FC236}">
+                <a16:creationId xmlns:a16="http://schemas.microsoft.com/office/drawing/2014/main" id="{D3091CE7-11C5-D045-81D8-F90455E0DDA9}"/>
+              </a:ext>
+            </a:extLst>
+          </p:cNvPr>
+          <p:cNvSpPr txBox="1"/>
+          <p:nvPr/>
+        </p:nvSpPr>
+        <p:spPr>
+          <a:xfrm>
+            <a:off x="7259003" y="3834148"/>
+            <a:ext cx="973921" cy="369332"/>
+          </a:xfrm>
+          <a:prstGeom prst="rect">
+            <a:avLst/>
+          </a:prstGeom>
+          <a:noFill/>
+        </p:spPr>
+        <p:txBody>
+          <a:bodyPr wrap="none" rtlCol="0">
+            <a:spAutoFit/>
+          </a:bodyPr>
+          <a:lstStyle/>
+          <a:p>
+            <a:r>
+              <a:rPr lang="en-GB" dirty="0">
+                <a:solidFill>
+                  <a:schemeClr val="bg1"/>
+                </a:solidFill>
+              </a:rPr>
+              <a:t>Backend</a:t>
+            </a:r>
+          </a:p>
+        </p:txBody>
+      </p:sp>
+      <p:sp>
+        <p:nvSpPr>
+          <p:cNvPr id="61" name="CuadroTexto 60">
+            <a:extLst>
+              <a:ext uri="{FF2B5EF4-FFF2-40B4-BE49-F238E27FC236}">
+                <a16:creationId xmlns:a16="http://schemas.microsoft.com/office/drawing/2014/main" id="{09CE2112-AD3B-2D4F-84F2-8B505BD4CED2}"/>
+              </a:ext>
+            </a:extLst>
+          </p:cNvPr>
+          <p:cNvSpPr txBox="1"/>
+          <p:nvPr/>
+        </p:nvSpPr>
+        <p:spPr>
+          <a:xfrm>
+            <a:off x="4068241" y="2870266"/>
+            <a:ext cx="1198213" cy="276999"/>
+          </a:xfrm>
+          <a:prstGeom prst="rect">
+            <a:avLst/>
+          </a:prstGeom>
+          <a:noFill/>
+        </p:spPr>
+        <p:txBody>
+          <a:bodyPr wrap="none" rtlCol="0">
+            <a:spAutoFit/>
+          </a:bodyPr>
+          <a:lstStyle/>
+          <a:p>
+            <a:r>
+              <a:rPr lang="en-GB" sz="1200" dirty="0"/>
+              <a:t>https://domain/</a:t>
+            </a:r>
+          </a:p>
+        </p:txBody>
+      </p:sp>
     </p:spTree>
     <p:extLst>
       <p:ext uri="{BB962C8B-B14F-4D97-AF65-F5344CB8AC3E}">

</xml_diff>